<commit_message>
KBLFR-1205: Fixed direction of X-Axis in Illustration "Geometric Properties of Connector Housings (Definitions)"
</commit_message>
<xml_diff>
--- a/vec/models/KBLFRM-1033.pptx
+++ b/vec/models/KBLFRM-1033.pptx
@@ -264,7 +264,7 @@
           <a:p>
             <a:fld id="{F85F0910-7A07-45F3-8372-6AAE0B9CB7BD}" type="datetimeFigureOut">
               <a:rPr lang="de-DE" smtClean="0"/>
-              <a:t>31.05.2021</a:t>
+              <a:t>11.09.2023</a:t>
             </a:fld>
             <a:endParaRPr lang="de-DE"/>
           </a:p>
@@ -462,7 +462,7 @@
           <a:p>
             <a:fld id="{F85F0910-7A07-45F3-8372-6AAE0B9CB7BD}" type="datetimeFigureOut">
               <a:rPr lang="de-DE" smtClean="0"/>
-              <a:t>31.05.2021</a:t>
+              <a:t>11.09.2023</a:t>
             </a:fld>
             <a:endParaRPr lang="de-DE"/>
           </a:p>
@@ -670,7 +670,7 @@
           <a:p>
             <a:fld id="{F85F0910-7A07-45F3-8372-6AAE0B9CB7BD}" type="datetimeFigureOut">
               <a:rPr lang="de-DE" smtClean="0"/>
-              <a:t>31.05.2021</a:t>
+              <a:t>11.09.2023</a:t>
             </a:fld>
             <a:endParaRPr lang="de-DE"/>
           </a:p>
@@ -868,7 +868,7 @@
           <a:p>
             <a:fld id="{F85F0910-7A07-45F3-8372-6AAE0B9CB7BD}" type="datetimeFigureOut">
               <a:rPr lang="de-DE" smtClean="0"/>
-              <a:t>31.05.2021</a:t>
+              <a:t>11.09.2023</a:t>
             </a:fld>
             <a:endParaRPr lang="de-DE"/>
           </a:p>
@@ -1143,7 +1143,7 @@
           <a:p>
             <a:fld id="{F85F0910-7A07-45F3-8372-6AAE0B9CB7BD}" type="datetimeFigureOut">
               <a:rPr lang="de-DE" smtClean="0"/>
-              <a:t>31.05.2021</a:t>
+              <a:t>11.09.2023</a:t>
             </a:fld>
             <a:endParaRPr lang="de-DE"/>
           </a:p>
@@ -1408,7 +1408,7 @@
           <a:p>
             <a:fld id="{F85F0910-7A07-45F3-8372-6AAE0B9CB7BD}" type="datetimeFigureOut">
               <a:rPr lang="de-DE" smtClean="0"/>
-              <a:t>31.05.2021</a:t>
+              <a:t>11.09.2023</a:t>
             </a:fld>
             <a:endParaRPr lang="de-DE"/>
           </a:p>
@@ -1820,7 +1820,7 @@
           <a:p>
             <a:fld id="{F85F0910-7A07-45F3-8372-6AAE0B9CB7BD}" type="datetimeFigureOut">
               <a:rPr lang="de-DE" smtClean="0"/>
-              <a:t>31.05.2021</a:t>
+              <a:t>11.09.2023</a:t>
             </a:fld>
             <a:endParaRPr lang="de-DE"/>
           </a:p>
@@ -1961,7 +1961,7 @@
           <a:p>
             <a:fld id="{F85F0910-7A07-45F3-8372-6AAE0B9CB7BD}" type="datetimeFigureOut">
               <a:rPr lang="de-DE" smtClean="0"/>
-              <a:t>31.05.2021</a:t>
+              <a:t>11.09.2023</a:t>
             </a:fld>
             <a:endParaRPr lang="de-DE"/>
           </a:p>
@@ -2074,7 +2074,7 @@
           <a:p>
             <a:fld id="{F85F0910-7A07-45F3-8372-6AAE0B9CB7BD}" type="datetimeFigureOut">
               <a:rPr lang="de-DE" smtClean="0"/>
-              <a:t>31.05.2021</a:t>
+              <a:t>11.09.2023</a:t>
             </a:fld>
             <a:endParaRPr lang="de-DE"/>
           </a:p>
@@ -2385,7 +2385,7 @@
           <a:p>
             <a:fld id="{F85F0910-7A07-45F3-8372-6AAE0B9CB7BD}" type="datetimeFigureOut">
               <a:rPr lang="de-DE" smtClean="0"/>
-              <a:t>31.05.2021</a:t>
+              <a:t>11.09.2023</a:t>
             </a:fld>
             <a:endParaRPr lang="de-DE"/>
           </a:p>
@@ -2673,7 +2673,7 @@
           <a:p>
             <a:fld id="{F85F0910-7A07-45F3-8372-6AAE0B9CB7BD}" type="datetimeFigureOut">
               <a:rPr lang="de-DE" smtClean="0"/>
-              <a:t>31.05.2021</a:t>
+              <a:t>11.09.2023</a:t>
             </a:fld>
             <a:endParaRPr lang="de-DE"/>
           </a:p>
@@ -2914,7 +2914,7 @@
           <a:p>
             <a:fld id="{F85F0910-7A07-45F3-8372-6AAE0B9CB7BD}" type="datetimeFigureOut">
               <a:rPr lang="de-DE" smtClean="0"/>
-              <a:t>31.05.2021</a:t>
+              <a:t>11.09.2023</a:t>
             </a:fld>
             <a:endParaRPr lang="de-DE"/>
           </a:p>
@@ -5262,6 +5262,55 @@
           </a:p>
         </p:txBody>
       </p:sp>
+      <p:sp>
+        <p:nvSpPr>
+          <p:cNvPr id="2" name="Rechteck 1">
+            <a:extLst>
+              <a:ext uri="{FF2B5EF4-FFF2-40B4-BE49-F238E27FC236}">
+                <a16:creationId xmlns:a16="http://schemas.microsoft.com/office/drawing/2014/main" id="{580B5270-A78F-8B58-0E00-66230769A7BE}"/>
+              </a:ext>
+            </a:extLst>
+          </p:cNvPr>
+          <p:cNvSpPr/>
+          <p:nvPr/>
+        </p:nvSpPr>
+        <p:spPr>
+          <a:xfrm>
+            <a:off x="771896" y="292925"/>
+            <a:ext cx="1644092" cy="539478"/>
+          </a:xfrm>
+          <a:prstGeom prst="rect">
+            <a:avLst/>
+          </a:prstGeom>
+        </p:spPr>
+        <p:style>
+          <a:lnRef idx="2">
+            <a:schemeClr val="accent1">
+              <a:shade val="15000"/>
+            </a:schemeClr>
+          </a:lnRef>
+          <a:fillRef idx="1">
+            <a:schemeClr val="accent1"/>
+          </a:fillRef>
+          <a:effectRef idx="0">
+            <a:schemeClr val="accent1"/>
+          </a:effectRef>
+          <a:fontRef idx="minor">
+            <a:schemeClr val="lt1"/>
+          </a:fontRef>
+        </p:style>
+        <p:txBody>
+          <a:bodyPr rtlCol="0" anchor="ctr"/>
+          <a:lstStyle/>
+          <a:p>
+            <a:pPr algn="ctr"/>
+            <a:r>
+              <a:rPr lang="de-DE" dirty="0"/>
+              <a:t>X-Achse falsch!</a:t>
+            </a:r>
+          </a:p>
+        </p:txBody>
+      </p:sp>
     </p:spTree>
     <p:extLst>
       <p:ext uri="{BB962C8B-B14F-4D97-AF65-F5344CB8AC3E}">
@@ -6378,9 +6427,9 @@
           <p:nvPr/>
         </p:nvCxnSpPr>
         <p:spPr>
-          <a:xfrm>
-            <a:off x="1443317" y="1853536"/>
-            <a:ext cx="0" cy="1077923"/>
+          <a:xfrm flipV="1">
+            <a:off x="1443317" y="1009403"/>
+            <a:ext cx="9731" cy="844133"/>
           </a:xfrm>
           <a:prstGeom prst="straightConnector1">
             <a:avLst/>
@@ -6418,7 +6467,7 @@
         </p:nvSpPr>
         <p:spPr>
           <a:xfrm>
-            <a:off x="1193752" y="2828150"/>
+            <a:off x="1419904" y="883894"/>
             <a:ext cx="264816" cy="276999"/>
           </a:xfrm>
           <a:prstGeom prst="rect">

</xml_diff>